<commit_message>
i updated the slides?
</commit_message>
<xml_diff>
--- a/talk-slides.pptx
+++ b/talk-slides.pptx
@@ -525,16 +525,28 @@
           <a:p>
             <a:r>
               <a:rPr lang="en-US" dirty="0"/>
-              <a:t>Thanks </a:t>
+              <a:t>Hello! I’m Steven Black, senior DevOps engineer at </a:t>
             </a:r>
             <a:r>
               <a:rPr lang="en-US" dirty="0" err="1"/>
-              <a:t>yous</a:t>
+              <a:t>Rhythmictech</a:t>
             </a:r>
             <a:r>
               <a:rPr lang="en-US" dirty="0"/>
-              <a:t> and Welcomes</a:t>
-            </a:r>
+              <a:t>. </a:t>
+            </a:r>
+          </a:p>
+          <a:p>
+            <a:endParaRPr lang="en-US" dirty="0"/>
+          </a:p>
+          <a:p>
+            <a:r>
+              <a:rPr lang="en-US" dirty="0"/>
+              <a:t>I’m here to talk to you about terraform-specific pre-commit hooks. </a:t>
+            </a:r>
+          </a:p>
+          <a:p>
+            <a:endParaRPr lang="en-US" dirty="0"/>
           </a:p>
           <a:p>
             <a:endParaRPr lang="en-US" dirty="0"/>
@@ -546,6 +558,60 @@
             </a:r>
           </a:p>
           <a:p>
+            <a:r>
+              <a:rPr lang="en-US" dirty="0"/>
+              <a:t>I will quickly go through what </a:t>
+            </a:r>
+          </a:p>
+          <a:p>
+            <a:pPr marL="171450" indent="-171450">
+              <a:buFontTx/>
+              <a:buChar char="-"/>
+            </a:pPr>
+            <a:r>
+              <a:rPr lang="en-US" dirty="0"/>
+              <a:t>A git workflow with an eye at the pre-commit hook</a:t>
+            </a:r>
+          </a:p>
+          <a:p>
+            <a:pPr marL="171450" indent="-171450">
+              <a:buFontTx/>
+              <a:buChar char="-"/>
+            </a:pPr>
+            <a:r>
+              <a:rPr lang="en-US" dirty="0"/>
+              <a:t>The pre-commit framework</a:t>
+            </a:r>
+          </a:p>
+          <a:p>
+            <a:pPr marL="171450" indent="-171450">
+              <a:buFontTx/>
+              <a:buChar char="-"/>
+            </a:pPr>
+            <a:r>
+              <a:rPr lang="en-US" dirty="0"/>
+              <a:t>A short demo</a:t>
+            </a:r>
+          </a:p>
+          <a:p>
+            <a:pPr marL="171450" indent="-171450">
+              <a:buFontTx/>
+              <a:buChar char="-"/>
+            </a:pPr>
+            <a:endParaRPr lang="en-US" dirty="0"/>
+          </a:p>
+          <a:p>
+            <a:pPr marL="171450" indent="-171450">
+              <a:buFontTx/>
+              <a:buChar char="-"/>
+            </a:pPr>
+            <a:endParaRPr lang="en-US" dirty="0"/>
+          </a:p>
+          <a:p>
+            <a:pPr marL="171450" indent="-171450">
+              <a:buFontTx/>
+              <a:buChar char="-"/>
+            </a:pPr>
             <a:endParaRPr lang="en-US" dirty="0"/>
           </a:p>
         </p:txBody>
@@ -630,7 +696,52 @@
           <a:bodyPr/>
           <a:lstStyle/>
           <a:p>
+            <a:r>
+              <a:rPr lang="en-US" dirty="0"/>
+              <a:t>Here’s a git workflow, diagramed with a simple explanation above a git command. </a:t>
+            </a:r>
+          </a:p>
+          <a:p>
             <a:endParaRPr lang="en-US" dirty="0"/>
+          </a:p>
+          <a:p>
+            <a:r>
+              <a:rPr lang="en-US" dirty="0"/>
+              <a:t>In between an engineer working on terraform and it arriving on GitHub there are a few steps. </a:t>
+            </a:r>
+          </a:p>
+          <a:p>
+            <a:r>
+              <a:rPr lang="en-US" dirty="0"/>
+              <a:t>First, you “add” the changes (or new file) to git. Git hasn’t saved it yet though, you’ve just pointed it out to git.</a:t>
+            </a:r>
+          </a:p>
+          <a:p>
+            <a:r>
+              <a:rPr lang="en-US" dirty="0"/>
+              <a:t>Then, you “commit” the changes to your git history. This saves is in git’s database.</a:t>
+            </a:r>
+          </a:p>
+          <a:p>
+            <a:r>
+              <a:rPr lang="en-US" dirty="0"/>
+              <a:t>Finally, you “push” the code where it goes to GitHub!</a:t>
+            </a:r>
+          </a:p>
+          <a:p>
+            <a:endParaRPr lang="en-US" dirty="0"/>
+          </a:p>
+          <a:p>
+            <a:r>
+              <a:rPr lang="en-US" dirty="0"/>
+              <a:t>When you try to commit code git will run the “pre-commit hook”, which is a reference to the “hook” design pattern.</a:t>
+            </a:r>
+          </a:p>
+          <a:p>
+            <a:r>
+              <a:rPr lang="en-US" dirty="0"/>
+              <a:t>It means that git gives us a way to call external programs before it will execute a commit. These programs can do cool things like automatically generate documentation, perform security scans, and lint for best practices. </a:t>
+            </a:r>
           </a:p>
         </p:txBody>
       </p:sp>
@@ -714,7 +825,16 @@
           <a:bodyPr/>
           <a:lstStyle/>
           <a:p>
-            <a:endParaRPr lang="en-US" dirty="0"/>
+            <a:r>
+              <a:rPr lang="en-US" dirty="0"/>
+              <a:t>I mentioned that pre-commit is the name of a hook and a framework. The pre-commit framework is just a package manager for pre-commit scripts. </a:t>
+            </a:r>
+          </a:p>
+          <a:p>
+            <a:r>
+              <a:rPr lang="en-US" dirty="0"/>
+              <a:t>What is a package manager? It’s like the app store – an application you use to download and install other applications. </a:t>
+            </a:r>
           </a:p>
         </p:txBody>
       </p:sp>
@@ -755,6 +875,90 @@
 </file>
 
 <file path=ppt/notesSlides/notesSlide4.xml><?xml version="1.0" encoding="utf-8"?>
+<p:notes xmlns:a="http://schemas.openxmlformats.org/drawingml/2006/main" xmlns:r="http://schemas.openxmlformats.org/officeDocument/2006/relationships" xmlns:p="http://schemas.openxmlformats.org/presentationml/2006/main">
+  <p:cSld>
+    <p:spTree>
+      <p:nvGrpSpPr>
+        <p:cNvPr id="1" name=""/>
+        <p:cNvGrpSpPr/>
+        <p:nvPr/>
+      </p:nvGrpSpPr>
+      <p:grpSpPr>
+        <a:xfrm>
+          <a:off x="0" y="0"/>
+          <a:ext cx="0" cy="0"/>
+          <a:chOff x="0" y="0"/>
+          <a:chExt cx="0" cy="0"/>
+        </a:xfrm>
+      </p:grpSpPr>
+      <p:sp>
+        <p:nvSpPr>
+          <p:cNvPr id="2" name="Slide Image Placeholder 1"/>
+          <p:cNvSpPr>
+            <a:spLocks noGrp="1" noRot="1" noChangeAspect="1"/>
+          </p:cNvSpPr>
+          <p:nvPr>
+            <p:ph type="sldImg"/>
+          </p:nvPr>
+        </p:nvSpPr>
+        <p:spPr/>
+      </p:sp>
+      <p:sp>
+        <p:nvSpPr>
+          <p:cNvPr id="3" name="Notes Placeholder 2"/>
+          <p:cNvSpPr>
+            <a:spLocks noGrp="1"/>
+          </p:cNvSpPr>
+          <p:nvPr>
+            <p:ph type="body" idx="1"/>
+          </p:nvPr>
+        </p:nvSpPr>
+        <p:spPr/>
+        <p:txBody>
+          <a:bodyPr/>
+          <a:lstStyle/>
+          <a:p>
+            <a:endParaRPr lang="en-US" dirty="0"/>
+          </a:p>
+        </p:txBody>
+      </p:sp>
+      <p:sp>
+        <p:nvSpPr>
+          <p:cNvPr id="4" name="Slide Number Placeholder 3"/>
+          <p:cNvSpPr>
+            <a:spLocks noGrp="1"/>
+          </p:cNvSpPr>
+          <p:nvPr>
+            <p:ph type="sldNum" sz="quarter" idx="5"/>
+          </p:nvPr>
+        </p:nvSpPr>
+        <p:spPr/>
+        <p:txBody>
+          <a:bodyPr/>
+          <a:lstStyle/>
+          <a:p>
+            <a:fld id="{4A057C9C-3932-CB40-B626-A2C3C2B64459}" type="slidenum">
+              <a:rPr lang="en-US" smtClean="0"/>
+              <a:t>4</a:t>
+            </a:fld>
+            <a:endParaRPr lang="en-US"/>
+          </a:p>
+        </p:txBody>
+      </p:sp>
+    </p:spTree>
+    <p:extLst>
+      <p:ext uri="{BB962C8B-B14F-4D97-AF65-F5344CB8AC3E}">
+        <p14:creationId xmlns:p14="http://schemas.microsoft.com/office/powerpoint/2010/main" val="432502841"/>
+      </p:ext>
+    </p:extLst>
+  </p:cSld>
+  <p:clrMapOvr>
+    <a:masterClrMapping/>
+  </p:clrMapOvr>
+</p:notes>
+</file>
+
+<file path=ppt/notesSlides/notesSlide5.xml><?xml version="1.0" encoding="utf-8"?>
 <p:notes xmlns:a="http://schemas.openxmlformats.org/drawingml/2006/main" xmlns:r="http://schemas.openxmlformats.org/officeDocument/2006/relationships" xmlns:p="http://schemas.openxmlformats.org/presentationml/2006/main">
   <p:cSld>
     <p:spTree>
@@ -4000,13 +4204,13 @@
           <p:nvPr/>
         </p:nvPicPr>
         <p:blipFill>
-          <a:blip r:embed="rId2">
+          <a:blip r:embed="rId3">
             <a:extLst>
               <a:ext uri="{28A0092B-C50C-407E-A947-70E740481C1C}">
                 <a14:useLocalDpi xmlns:a14="http://schemas.microsoft.com/office/drawing/2010/main" val="0"/>
               </a:ext>
               <a:ext uri="{837473B0-CC2E-450A-ABE3-18F120FF3D39}">
-                <a1611:picAttrSrcUrl xmlns:a1611="http://schemas.microsoft.com/office/drawing/2016/11/main" r:id="rId3"/>
+                <a1611:picAttrSrcUrl xmlns:a1611="http://schemas.microsoft.com/office/drawing/2016/11/main" r:id="rId4"/>
               </a:ext>
             </a:extLst>
           </a:blip>
@@ -4039,13 +4243,13 @@
           <p:nvPr/>
         </p:nvPicPr>
         <p:blipFill>
-          <a:blip r:embed="rId4">
+          <a:blip r:embed="rId5">
             <a:extLst>
               <a:ext uri="{28A0092B-C50C-407E-A947-70E740481C1C}">
                 <a14:useLocalDpi xmlns:a14="http://schemas.microsoft.com/office/drawing/2010/main" val="0"/>
               </a:ext>
               <a:ext uri="{837473B0-CC2E-450A-ABE3-18F120FF3D39}">
-                <a1611:picAttrSrcUrl xmlns:a1611="http://schemas.microsoft.com/office/drawing/2016/11/main" r:id="rId5"/>
+                <a1611:picAttrSrcUrl xmlns:a1611="http://schemas.microsoft.com/office/drawing/2016/11/main" r:id="rId6"/>
               </a:ext>
             </a:extLst>
           </a:blip>

</xml_diff>